<commit_message>
Finished implementation of Chapter 5: Technologies
</commit_message>
<xml_diff>
--- a/Pie.pptx
+++ b/Pie.pptx
@@ -16,7 +16,8 @@
     <p:sldId id="265" r:id="rId10"/>
     <p:sldId id="266" r:id="rId11"/>
     <p:sldId id="267" r:id="rId12"/>
-    <p:sldId id="269" r:id="rId13"/>
+    <p:sldId id="270" r:id="rId13"/>
+    <p:sldId id="269" r:id="rId14"/>
   </p:sldIdLst>
   <p:sldSz cx="9144000" cy="6858000" type="screen4x3"/>
   <p:notesSz cx="6858000" cy="9144000"/>
@@ -3488,6 +3489,182 @@
       </p:grpSpPr>
       <p:pic>
         <p:nvPicPr>
+          <p:cNvPr id="2" name="Picture 1" descr="slide1a_mod.jpg"/>
+          <p:cNvPicPr>
+            <a:picLocks noChangeAspect="1"/>
+          </p:cNvPicPr>
+          <p:nvPr/>
+        </p:nvPicPr>
+        <p:blipFill>
+          <a:blip r:embed="rId2">
+            <a:extLst>
+              <a:ext uri="{28A0092B-C50C-407E-A947-70E740481C1C}">
+                <a14:useLocalDpi xmlns:a14="http://schemas.microsoft.com/office/drawing/2010/main" val="0"/>
+              </a:ext>
+            </a:extLst>
+          </a:blip>
+          <a:stretch>
+            <a:fillRect/>
+          </a:stretch>
+        </p:blipFill>
+        <p:spPr>
+          <a:xfrm>
+            <a:off x="12700" y="0"/>
+            <a:ext cx="9113621" cy="6858000"/>
+          </a:xfrm>
+          <a:prstGeom prst="rect">
+            <a:avLst/>
+          </a:prstGeom>
+        </p:spPr>
+      </p:pic>
+      <p:sp>
+        <p:nvSpPr>
+          <p:cNvPr id="5" name="TextBox 4"/>
+          <p:cNvSpPr txBox="1"/>
+          <p:nvPr/>
+        </p:nvSpPr>
+        <p:spPr>
+          <a:xfrm>
+            <a:off x="160549" y="1109546"/>
+            <a:ext cx="7065818" cy="3785652"/>
+          </a:xfrm>
+          <a:prstGeom prst="rect">
+            <a:avLst/>
+          </a:prstGeom>
+          <a:noFill/>
+          <a:effectLst>
+            <a:outerShdw blurRad="50800" dist="38100" dir="2700000" algn="tl" rotWithShape="0">
+              <a:prstClr val="black">
+                <a:alpha val="40000"/>
+              </a:prstClr>
+            </a:outerShdw>
+          </a:effectLst>
+        </p:spPr>
+        <p:txBody>
+          <a:bodyPr wrap="square" rtlCol="0">
+            <a:spAutoFit/>
+          </a:bodyPr>
+          <a:lstStyle/>
+          <a:p>
+            <a:r>
+              <a:rPr lang="en-US" sz="4000" dirty="0">
+                <a:solidFill>
+                  <a:schemeClr val="bg1"/>
+                </a:solidFill>
+                <a:latin typeface="Myriad Pro Cond" panose="020B0506030403020204" pitchFamily="34" charset="0"/>
+              </a:rPr>
+              <a:t>Conclusions</a:t>
+            </a:r>
+          </a:p>
+          <a:p>
+            <a:endParaRPr lang="en-US" sz="4000" dirty="0">
+              <a:solidFill>
+                <a:schemeClr val="bg1"/>
+              </a:solidFill>
+              <a:latin typeface="Myriad Pro Cond" panose="020B0506030403020204" pitchFamily="34" charset="0"/>
+            </a:endParaRPr>
+          </a:p>
+          <a:p>
+            <a:pPr marL="742950" indent="-742950">
+              <a:buAutoNum type="arabicPeriod"/>
+            </a:pPr>
+            <a:r>
+              <a:rPr lang="en-US" sz="2400" dirty="0">
+                <a:solidFill>
+                  <a:srgbClr val="0020DE"/>
+                </a:solidFill>
+                <a:latin typeface="Myriad Pro Cond" panose="020B0506030403020204" pitchFamily="34" charset="0"/>
+              </a:rPr>
+              <a:t>Pie offers minimality.</a:t>
+            </a:r>
+          </a:p>
+          <a:p>
+            <a:pPr marL="742950" indent="-742950">
+              <a:buAutoNum type="arabicPeriod"/>
+            </a:pPr>
+            <a:r>
+              <a:rPr lang="en-US" sz="2400" dirty="0">
+                <a:solidFill>
+                  <a:srgbClr val="0020DE"/>
+                </a:solidFill>
+                <a:latin typeface="Myriad Pro Cond" panose="020B0506030403020204" pitchFamily="34" charset="0"/>
+              </a:rPr>
+              <a:t>It doesn’t lack important features.</a:t>
+            </a:r>
+          </a:p>
+          <a:p>
+            <a:pPr marL="742950" indent="-742950">
+              <a:buAutoNum type="arabicPeriod"/>
+            </a:pPr>
+            <a:r>
+              <a:rPr lang="en-US" sz="2400" dirty="0">
+                <a:solidFill>
+                  <a:srgbClr val="0020DE"/>
+                </a:solidFill>
+                <a:latin typeface="Myriad Pro Cond" panose="020B0506030403020204" pitchFamily="34" charset="0"/>
+              </a:rPr>
+              <a:t>It is entirely open-source</a:t>
+            </a:r>
+          </a:p>
+          <a:p>
+            <a:pPr marL="742950" indent="-742950">
+              <a:buAutoNum type="arabicPeriod"/>
+            </a:pPr>
+            <a:r>
+              <a:rPr lang="en-US" sz="2400" dirty="0">
+                <a:solidFill>
+                  <a:srgbClr val="0020DE"/>
+                </a:solidFill>
+                <a:latin typeface="Myriad Pro Cond" panose="020B0506030403020204" pitchFamily="34" charset="0"/>
+              </a:rPr>
+              <a:t>Will get improved over time, and can also be improved by the community</a:t>
+            </a:r>
+          </a:p>
+          <a:p>
+            <a:pPr marL="742950" indent="-742950">
+              <a:buAutoNum type="arabicPeriod"/>
+            </a:pPr>
+            <a:endParaRPr lang="en-US" sz="4000" dirty="0">
+              <a:solidFill>
+                <a:schemeClr val="bg1"/>
+              </a:solidFill>
+              <a:latin typeface="Myriad Pro Cond" panose="020B0506030403020204" pitchFamily="34" charset="0"/>
+            </a:endParaRPr>
+          </a:p>
+        </p:txBody>
+      </p:sp>
+    </p:spTree>
+    <p:extLst>
+      <p:ext uri="{BB962C8B-B14F-4D97-AF65-F5344CB8AC3E}">
+        <p14:creationId xmlns:p14="http://schemas.microsoft.com/office/powerpoint/2010/main" val="3940683005"/>
+      </p:ext>
+    </p:extLst>
+  </p:cSld>
+  <p:clrMapOvr>
+    <a:masterClrMapping/>
+  </p:clrMapOvr>
+</p:sld>
+</file>
+
+<file path=ppt/slides/slide13.xml><?xml version="1.0" encoding="utf-8"?>
+<p:sld xmlns:a="http://schemas.openxmlformats.org/drawingml/2006/main" xmlns:r="http://schemas.openxmlformats.org/officeDocument/2006/relationships" xmlns:p="http://schemas.openxmlformats.org/presentationml/2006/main">
+  <p:cSld>
+    <p:spTree>
+      <p:nvGrpSpPr>
+        <p:cNvPr id="1" name=""/>
+        <p:cNvGrpSpPr/>
+        <p:nvPr/>
+      </p:nvGrpSpPr>
+      <p:grpSpPr>
+        <a:xfrm>
+          <a:off x="0" y="0"/>
+          <a:ext cx="0" cy="0"/>
+          <a:chOff x="0" y="0"/>
+          <a:chExt cx="0" cy="0"/>
+        </a:xfrm>
+      </p:grpSpPr>
+      <p:pic>
+        <p:nvPicPr>
           <p:cNvPr id="2" name="Picture 1" descr="slide4_mod.jpg"/>
           <p:cNvPicPr>
             <a:picLocks noChangeAspect="1"/>

</xml_diff>